<commit_message>
Update Simulation File Treatment and Slides
</commit_message>
<xml_diff>
--- a/Data Standards for Collaboration.pptx
+++ b/Data Standards for Collaboration.pptx
@@ -3385,9 +3385,10 @@
           </a:p>
           <a:p>
             <a:r>
-              <a:rPr lang="en-US" dirty="0"/>
-              <a:t>2025-10-07</a:t>
-            </a:r>
+              <a:rPr lang="en-US"/>
+              <a:t>2025-10-10</a:t>
+            </a:r>
+            <a:endParaRPr lang="en-US" dirty="0"/>
           </a:p>
         </p:txBody>
       </p:sp>
@@ -3478,21 +3479,9 @@
         </p:spPr>
         <p:txBody>
           <a:bodyPr>
-            <a:normAutofit fontScale="92500" lnSpcReduction="20000"/>
+            <a:normAutofit lnSpcReduction="10000"/>
           </a:bodyPr>
           <a:lstStyle/>
-          <a:p>
-            <a:r>
-              <a:rPr lang="en-US" dirty="0"/>
-              <a:t>To facilitate collaboration, particularly between institutions</a:t>
-            </a:r>
-          </a:p>
-          <a:p>
-            <a:r>
-              <a:rPr lang="en-US" dirty="0"/>
-              <a:t>A standard format allows for easy sharing, standardized model creation, interoperability</a:t>
-            </a:r>
-          </a:p>
           <a:p>
             <a:r>
               <a:rPr lang="en-US" dirty="0"/>
@@ -3530,7 +3519,7 @@
             <a:pPr lvl="1"/>
             <a:r>
               <a:rPr lang="en-US" dirty="0"/>
-              <a:t>For this effort to become a true standard to go alongside other standards in the field, such as:</a:t>
+              <a:t>For this effort to become or be folded into a true standard to go alongside other standards in the field, such as:</a:t>
             </a:r>
           </a:p>
           <a:p>
@@ -3858,7 +3847,7 @@
             <a:pPr lvl="1"/>
             <a:r>
               <a:rPr lang="en-US" dirty="0"/>
-              <a:t>Python classes that define the data standard (with type validation, </a:t>
+              <a:t>Python classes that define the data standard (with input validation, </a:t>
             </a:r>
             <a:r>
               <a:rPr lang="en-US" dirty="0" err="1"/>
@@ -4577,7 +4566,15 @@
             </a:r>
             <a:r>
               <a:rPr lang="en-US" dirty="0"/>
-              <a:t> object (accepts 2-D np array, too, IFF pixel calibration is specified in attributes)</a:t>
+              <a:t> object (accepts 2-D </a:t>
+            </a:r>
+            <a:r>
+              <a:rPr lang="en-US" dirty="0" err="1"/>
+              <a:t>np.array</a:t>
+            </a:r>
+            <a:r>
+              <a:rPr lang="en-US" dirty="0"/>
+              <a:t>, too, IFF pixel calibration is specified in attributes)</a:t>
             </a:r>
           </a:p>
         </p:txBody>
@@ -4939,49 +4936,19 @@
           <a:chExt cx="0" cy="0"/>
         </a:xfrm>
       </p:grpSpPr>
-      <p:sp>
-        <p:nvSpPr>
-          <p:cNvPr id="2" name="Title 1">
-            <a:extLst>
-              <a:ext uri="{FF2B5EF4-FFF2-40B4-BE49-F238E27FC236}">
-                <a16:creationId xmlns:a16="http://schemas.microsoft.com/office/drawing/2014/main" id="{CE1AFC52-BA16-C39C-F966-034A99B901E1}"/>
-              </a:ext>
-            </a:extLst>
-          </p:cNvPr>
-          <p:cNvSpPr>
-            <a:spLocks noGrp="1"/>
-          </p:cNvSpPr>
-          <p:nvPr>
-            <p:ph type="title"/>
-          </p:nvPr>
-        </p:nvSpPr>
-        <p:spPr/>
-        <p:txBody>
-          <a:bodyPr/>
-          <a:lstStyle/>
-          <a:p>
-            <a:r>
-              <a:rPr lang="en-US" dirty="0"/>
-              <a:t>Lattice</a:t>
-            </a:r>
-          </a:p>
-        </p:txBody>
-      </p:sp>
       <p:pic>
         <p:nvPicPr>
-          <p:cNvPr id="6" name="Content Placeholder 5">
-            <a:extLst>
-              <a:ext uri="{FF2B5EF4-FFF2-40B4-BE49-F238E27FC236}">
-                <a16:creationId xmlns:a16="http://schemas.microsoft.com/office/drawing/2014/main" id="{A02B5BBB-2482-D64D-13A7-A8994CE6FAFF}"/>
+          <p:cNvPr id="14" name="Picture 13">
+            <a:extLst>
+              <a:ext uri="{FF2B5EF4-FFF2-40B4-BE49-F238E27FC236}">
+                <a16:creationId xmlns:a16="http://schemas.microsoft.com/office/drawing/2014/main" id="{962BD5ED-C69C-CC3C-6245-EEBE1CA757F2}"/>
               </a:ext>
             </a:extLst>
           </p:cNvPr>
           <p:cNvPicPr>
-            <a:picLocks noGrp="1" noChangeAspect="1"/>
+            <a:picLocks noChangeAspect="1"/>
           </p:cNvPicPr>
-          <p:nvPr>
-            <p:ph sz="half" idx="1"/>
-          </p:nvPr>
+          <p:nvPr/>
         </p:nvPicPr>
         <p:blipFill>
           <a:blip r:embed="rId2"/>
@@ -4991,8 +4958,8 @@
         </p:blipFill>
         <p:spPr>
           <a:xfrm>
-            <a:off x="912189" y="1539859"/>
-            <a:ext cx="2724530" cy="3334215"/>
+            <a:off x="780865" y="1561379"/>
+            <a:ext cx="2648320" cy="3524742"/>
           </a:xfrm>
           <a:prstGeom prst="rect">
             <a:avLst/>
@@ -5001,6 +4968,34 @@
       </p:pic>
       <p:sp>
         <p:nvSpPr>
+          <p:cNvPr id="2" name="Title 1">
+            <a:extLst>
+              <a:ext uri="{FF2B5EF4-FFF2-40B4-BE49-F238E27FC236}">
+                <a16:creationId xmlns:a16="http://schemas.microsoft.com/office/drawing/2014/main" id="{CE1AFC52-BA16-C39C-F966-034A99B901E1}"/>
+              </a:ext>
+            </a:extLst>
+          </p:cNvPr>
+          <p:cNvSpPr>
+            <a:spLocks noGrp="1"/>
+          </p:cNvSpPr>
+          <p:nvPr>
+            <p:ph type="title"/>
+          </p:nvPr>
+        </p:nvSpPr>
+        <p:spPr/>
+        <p:txBody>
+          <a:bodyPr/>
+          <a:lstStyle/>
+          <a:p>
+            <a:r>
+              <a:rPr lang="en-US" dirty="0"/>
+              <a:t>Lattice</a:t>
+            </a:r>
+          </a:p>
+        </p:txBody>
+      </p:sp>
+      <p:sp>
+        <p:nvSpPr>
           <p:cNvPr id="4" name="Content Placeholder 3">
             <a:extLst>
               <a:ext uri="{FF2B5EF4-FFF2-40B4-BE49-F238E27FC236}">
@@ -5023,7 +5018,7 @@
         </p:spPr>
         <p:txBody>
           <a:bodyPr>
-            <a:normAutofit fontScale="85000" lnSpcReduction="10000"/>
+            <a:normAutofit fontScale="85000" lnSpcReduction="20000"/>
           </a:bodyPr>
           <a:lstStyle/>
           <a:p>
@@ -5116,6 +5111,24 @@
                 <a:sym typeface="Wingdings" panose="05000000000000000000" pitchFamily="2" charset="2"/>
               </a:rPr>
               <a:t>For custom lattices</a:t>
+            </a:r>
+          </a:p>
+          <a:p>
+            <a:pPr marL="514350" indent="-514350">
+              <a:buFont typeface="+mj-lt"/>
+              <a:buAutoNum type="arabicPeriod"/>
+            </a:pPr>
+            <a:r>
+              <a:rPr lang="en-US" dirty="0" err="1">
+                <a:sym typeface="Wingdings" panose="05000000000000000000" pitchFamily="2" charset="2"/>
+              </a:rPr>
+              <a:t>Simulation_input_file</a:t>
+            </a:r>
+            <a:r>
+              <a:rPr lang="en-US" dirty="0">
+                <a:sym typeface="Wingdings" panose="05000000000000000000" pitchFamily="2" charset="2"/>
+              </a:rPr>
+              <a:t>, for simulations only</a:t>
             </a:r>
           </a:p>
         </p:txBody>
@@ -5238,7 +5251,7 @@
         </p:nvSpPr>
         <p:spPr>
           <a:xfrm>
-            <a:off x="2538206" y="4353167"/>
+            <a:off x="2563507" y="3900585"/>
             <a:ext cx="301752" cy="301752"/>
           </a:xfrm>
           <a:prstGeom prst="ellipse">
@@ -5334,6 +5347,115 @@
             <a:r>
               <a:rPr lang="en-US" dirty="0"/>
               <a:t>2</a:t>
+            </a:r>
+          </a:p>
+        </p:txBody>
+      </p:sp>
+      <p:sp>
+        <p:nvSpPr>
+          <p:cNvPr id="17" name="Oval 16">
+            <a:extLst>
+              <a:ext uri="{FF2B5EF4-FFF2-40B4-BE49-F238E27FC236}">
+                <a16:creationId xmlns:a16="http://schemas.microsoft.com/office/drawing/2014/main" id="{AA321E7C-49B8-58A1-54FE-22C68219F06A}"/>
+              </a:ext>
+            </a:extLst>
+          </p:cNvPr>
+          <p:cNvSpPr/>
+          <p:nvPr/>
+        </p:nvSpPr>
+        <p:spPr>
+          <a:xfrm>
+            <a:off x="1408803" y="4380552"/>
+            <a:ext cx="1500653" cy="307111"/>
+          </a:xfrm>
+          <a:prstGeom prst="ellipse">
+            <a:avLst/>
+          </a:prstGeom>
+          <a:noFill/>
+          <a:ln>
+            <a:solidFill>
+              <a:srgbClr val="FF0000"/>
+            </a:solidFill>
+          </a:ln>
+        </p:spPr>
+        <p:style>
+          <a:lnRef idx="2">
+            <a:schemeClr val="accent1">
+              <a:shade val="15000"/>
+            </a:schemeClr>
+          </a:lnRef>
+          <a:fillRef idx="1">
+            <a:schemeClr val="accent1"/>
+          </a:fillRef>
+          <a:effectRef idx="0">
+            <a:schemeClr val="accent1"/>
+          </a:effectRef>
+          <a:fontRef idx="minor">
+            <a:schemeClr val="lt1"/>
+          </a:fontRef>
+        </p:style>
+        <p:txBody>
+          <a:bodyPr rtlCol="0" anchor="ctr"/>
+          <a:lstStyle/>
+          <a:p>
+            <a:pPr algn="ctr"/>
+            <a:endParaRPr lang="en-US"/>
+          </a:p>
+        </p:txBody>
+      </p:sp>
+      <p:sp>
+        <p:nvSpPr>
+          <p:cNvPr id="18" name="Oval 17">
+            <a:extLst>
+              <a:ext uri="{FF2B5EF4-FFF2-40B4-BE49-F238E27FC236}">
+                <a16:creationId xmlns:a16="http://schemas.microsoft.com/office/drawing/2014/main" id="{91E28CDC-EE29-3BFC-7548-379AD3DE8678}"/>
+              </a:ext>
+            </a:extLst>
+          </p:cNvPr>
+          <p:cNvSpPr/>
+          <p:nvPr/>
+        </p:nvSpPr>
+        <p:spPr>
+          <a:xfrm>
+            <a:off x="2714383" y="4669191"/>
+            <a:ext cx="301752" cy="301752"/>
+          </a:xfrm>
+          <a:prstGeom prst="ellipse">
+            <a:avLst/>
+          </a:prstGeom>
+          <a:solidFill>
+            <a:srgbClr val="FF0000"/>
+          </a:solidFill>
+          <a:ln>
+            <a:solidFill>
+              <a:srgbClr val="FF0000"/>
+            </a:solidFill>
+          </a:ln>
+        </p:spPr>
+        <p:style>
+          <a:lnRef idx="2">
+            <a:schemeClr val="accent1">
+              <a:shade val="15000"/>
+            </a:schemeClr>
+          </a:lnRef>
+          <a:fillRef idx="1">
+            <a:schemeClr val="accent1"/>
+          </a:fillRef>
+          <a:effectRef idx="0">
+            <a:schemeClr val="accent1"/>
+          </a:effectRef>
+          <a:fontRef idx="minor">
+            <a:schemeClr val="lt1"/>
+          </a:fontRef>
+        </p:style>
+        <p:txBody>
+          <a:bodyPr rtlCol="0" anchor="ctr"/>
+          <a:lstStyle/>
+          <a:p>
+            <a:pPr algn="ctr"/>
+            <a:r>
+              <a:rPr lang="en-US" dirty="0"/>
+              <a:t>3</a:t>
             </a:r>
           </a:p>
         </p:txBody>
@@ -6513,18 +6635,6 @@
           <a:p>
             <a:r>
               <a:rPr lang="en-US" dirty="0"/>
-              <a:t>Unique hash for each file vs inputs/lattice only</a:t>
-            </a:r>
-          </a:p>
-          <a:p>
-            <a:r>
-              <a:rPr lang="en-US" dirty="0"/>
-              <a:t>Other data types</a:t>
-            </a:r>
-          </a:p>
-          <a:p>
-            <a:r>
-              <a:rPr lang="en-US" dirty="0"/>
               <a:t>Batch sharing </a:t>
             </a:r>
             <a:r>
@@ -6563,20 +6673,23 @@
           </a:p>
           <a:p>
             <a:r>
+              <a:rPr lang="en-US" dirty="0"/>
+              <a:t>Unique hash for each file vs inputs/lattice only</a:t>
+            </a:r>
+          </a:p>
+          <a:p>
+            <a:r>
+              <a:rPr lang="en-US" dirty="0"/>
+              <a:t>Other data types</a:t>
+            </a:r>
+          </a:p>
+          <a:p>
+            <a:r>
               <a:rPr lang="en-US" dirty="0">
                 <a:sym typeface="Wingdings" panose="05000000000000000000" pitchFamily="2" charset="2"/>
               </a:rPr>
-              <a:t>PALS integration</a:t>
-            </a:r>
-            <a:r>
-              <a:rPr lang="en-US">
-                <a:sym typeface="Wingdings" panose="05000000000000000000" pitchFamily="2" charset="2"/>
-              </a:rPr>
-              <a:t>/collaboration</a:t>
-            </a:r>
-            <a:endParaRPr lang="en-US" dirty="0">
-              <a:sym typeface="Wingdings" panose="05000000000000000000" pitchFamily="2" charset="2"/>
-            </a:endParaRPr>
+              <a:t>PALS integration/collaboration</a:t>
+            </a:r>
           </a:p>
           <a:p>
             <a:pPr lvl="1"/>

</xml_diff>